<commit_message>
added more pictures, further updates on ppt
</commit_message>
<xml_diff>
--- a/Presentation_Health_Scores_CAP2.pptx
+++ b/Presentation_Health_Scores_CAP2.pptx
@@ -121,7 +121,7 @@
 <file path=ppt/revisionInfo.xml><?xml version="1.0" encoding="utf-8"?>
 <p1510:revInfo xmlns:a="http://schemas.openxmlformats.org/drawingml/2006/main" xmlns:r="http://schemas.openxmlformats.org/officeDocument/2006/relationships" xmlns:p1510="http://schemas.microsoft.com/office/powerpoint/2015/10/main">
   <p1510:revLst>
-    <p1510:client id="{0011081B-F696-42EB-A1AD-0C3DAE63D03F}" v="32" dt="2019-11-26T22:57:10.459"/>
+    <p1510:client id="{0011081B-F696-42EB-A1AD-0C3DAE63D03F}" v="38" dt="2019-11-27T00:02:25.230"/>
   </p1510:revLst>
 </p1510:revInfo>
 </file>
@@ -131,7 +131,7 @@
   <pc:docChgLst>
     <pc:chgData name="BILLY FETZNER" userId="b71de0b7-effb-42ad-83f4-88aca26ed7aa" providerId="ADAL" clId="{0011081B-F696-42EB-A1AD-0C3DAE63D03F}"/>
     <pc:docChg chg="undo custSel addSld delSld modSld sldOrd">
-      <pc:chgData name="BILLY FETZNER" userId="b71de0b7-effb-42ad-83f4-88aca26ed7aa" providerId="ADAL" clId="{0011081B-F696-42EB-A1AD-0C3DAE63D03F}" dt="2019-11-26T23:29:10.094" v="1959" actId="20577"/>
+      <pc:chgData name="BILLY FETZNER" userId="b71de0b7-effb-42ad-83f4-88aca26ed7aa" providerId="ADAL" clId="{0011081B-F696-42EB-A1AD-0C3DAE63D03F}" dt="2019-11-27T00:02:54.127" v="2556" actId="1076"/>
       <pc:docMkLst>
         <pc:docMk/>
       </pc:docMkLst>
@@ -307,8 +307,8 @@
           </ac:picMkLst>
         </pc:picChg>
       </pc:sldChg>
-      <pc:sldChg chg="modSp add ord">
-        <pc:chgData name="BILLY FETZNER" userId="b71de0b7-effb-42ad-83f4-88aca26ed7aa" providerId="ADAL" clId="{0011081B-F696-42EB-A1AD-0C3DAE63D03F}" dt="2019-11-26T23:29:10.094" v="1959" actId="20577"/>
+      <pc:sldChg chg="addSp modSp add ord">
+        <pc:chgData name="BILLY FETZNER" userId="b71de0b7-effb-42ad-83f4-88aca26ed7aa" providerId="ADAL" clId="{0011081B-F696-42EB-A1AD-0C3DAE63D03F}" dt="2019-11-26T23:38:16.863" v="2107" actId="14100"/>
         <pc:sldMkLst>
           <pc:docMk/>
           <pc:sldMk cId="9668516" sldId="262"/>
@@ -322,42 +322,114 @@
           </ac:spMkLst>
         </pc:spChg>
         <pc:spChg chg="mod">
-          <ac:chgData name="BILLY FETZNER" userId="b71de0b7-effb-42ad-83f4-88aca26ed7aa" providerId="ADAL" clId="{0011081B-F696-42EB-A1AD-0C3DAE63D03F}" dt="2019-11-26T23:09:11.389" v="1918" actId="20577"/>
+          <ac:chgData name="BILLY FETZNER" userId="b71de0b7-effb-42ad-83f4-88aca26ed7aa" providerId="ADAL" clId="{0011081B-F696-42EB-A1AD-0C3DAE63D03F}" dt="2019-11-26T23:37:55.142" v="2101" actId="20577"/>
           <ac:spMkLst>
             <pc:docMk/>
             <pc:sldMk cId="9668516" sldId="262"/>
             <ac:spMk id="3" creationId="{76B2996B-FC6D-4E7A-AFE0-D58567CCF160}"/>
           </ac:spMkLst>
         </pc:spChg>
+        <pc:picChg chg="add mod">
+          <ac:chgData name="BILLY FETZNER" userId="b71de0b7-effb-42ad-83f4-88aca26ed7aa" providerId="ADAL" clId="{0011081B-F696-42EB-A1AD-0C3DAE63D03F}" dt="2019-11-26T23:37:58.803" v="2102" actId="14100"/>
+          <ac:picMkLst>
+            <pc:docMk/>
+            <pc:sldMk cId="9668516" sldId="262"/>
+            <ac:picMk id="5" creationId="{7CA15F40-C6E1-4428-9C79-1D05F46AEA7F}"/>
+          </ac:picMkLst>
+        </pc:picChg>
+        <pc:picChg chg="add mod">
+          <ac:chgData name="BILLY FETZNER" userId="b71de0b7-effb-42ad-83f4-88aca26ed7aa" providerId="ADAL" clId="{0011081B-F696-42EB-A1AD-0C3DAE63D03F}" dt="2019-11-26T23:38:16.863" v="2107" actId="14100"/>
+          <ac:picMkLst>
+            <pc:docMk/>
+            <pc:sldMk cId="9668516" sldId="262"/>
+            <ac:picMk id="7" creationId="{D0F6B1D1-0B7A-47AE-A0DF-5946F5484BEC}"/>
+          </ac:picMkLst>
+        </pc:picChg>
       </pc:sldChg>
-      <pc:sldChg chg="modSp add">
-        <pc:chgData name="BILLY FETZNER" userId="b71de0b7-effb-42ad-83f4-88aca26ed7aa" providerId="ADAL" clId="{0011081B-F696-42EB-A1AD-0C3DAE63D03F}" dt="2019-11-26T22:49:30.973" v="809" actId="20577"/>
+      <pc:sldChg chg="addSp modSp add">
+        <pc:chgData name="BILLY FETZNER" userId="b71de0b7-effb-42ad-83f4-88aca26ed7aa" providerId="ADAL" clId="{0011081B-F696-42EB-A1AD-0C3DAE63D03F}" dt="2019-11-27T00:02:44.868" v="2555" actId="14100"/>
         <pc:sldMkLst>
           <pc:docMk/>
           <pc:sldMk cId="3330331717" sldId="263"/>
         </pc:sldMkLst>
         <pc:spChg chg="mod">
-          <ac:chgData name="BILLY FETZNER" userId="b71de0b7-effb-42ad-83f4-88aca26ed7aa" providerId="ADAL" clId="{0011081B-F696-42EB-A1AD-0C3DAE63D03F}" dt="2019-11-26T22:49:30.973" v="809" actId="20577"/>
+          <ac:chgData name="BILLY FETZNER" userId="b71de0b7-effb-42ad-83f4-88aca26ed7aa" providerId="ADAL" clId="{0011081B-F696-42EB-A1AD-0C3DAE63D03F}" dt="2019-11-26T23:45:11.933" v="2315" actId="20577"/>
           <ac:spMkLst>
             <pc:docMk/>
             <pc:sldMk cId="3330331717" sldId="263"/>
             <ac:spMk id="2" creationId="{B1305C7A-2F7A-4922-8976-3471C885EE50}"/>
           </ac:spMkLst>
         </pc:spChg>
+        <pc:spChg chg="mod">
+          <ac:chgData name="BILLY FETZNER" userId="b71de0b7-effb-42ad-83f4-88aca26ed7aa" providerId="ADAL" clId="{0011081B-F696-42EB-A1AD-0C3DAE63D03F}" dt="2019-11-27T00:02:41.835" v="2554" actId="14100"/>
+          <ac:spMkLst>
+            <pc:docMk/>
+            <pc:sldMk cId="3330331717" sldId="263"/>
+            <ac:spMk id="3" creationId="{76B2996B-FC6D-4E7A-AFE0-D58567CCF160}"/>
+          </ac:spMkLst>
+        </pc:spChg>
+        <pc:picChg chg="add mod">
+          <ac:chgData name="BILLY FETZNER" userId="b71de0b7-effb-42ad-83f4-88aca26ed7aa" providerId="ADAL" clId="{0011081B-F696-42EB-A1AD-0C3DAE63D03F}" dt="2019-11-27T00:02:44.868" v="2555" actId="14100"/>
+          <ac:picMkLst>
+            <pc:docMk/>
+            <pc:sldMk cId="3330331717" sldId="263"/>
+            <ac:picMk id="5" creationId="{39C1EFCD-FF98-44B1-9260-49C526E4AB0C}"/>
+          </ac:picMkLst>
+        </pc:picChg>
       </pc:sldChg>
-      <pc:sldChg chg="add">
-        <pc:chgData name="BILLY FETZNER" userId="b71de0b7-effb-42ad-83f4-88aca26ed7aa" providerId="ADAL" clId="{0011081B-F696-42EB-A1AD-0C3DAE63D03F}" dt="2019-11-26T22:49:34.932" v="810"/>
+      <pc:sldChg chg="modSp add">
+        <pc:chgData name="BILLY FETZNER" userId="b71de0b7-effb-42ad-83f4-88aca26ed7aa" providerId="ADAL" clId="{0011081B-F696-42EB-A1AD-0C3DAE63D03F}" dt="2019-11-27T00:02:54.127" v="2556" actId="1076"/>
         <pc:sldMkLst>
           <pc:docMk/>
           <pc:sldMk cId="3455149168" sldId="264"/>
         </pc:sldMkLst>
+        <pc:spChg chg="mod">
+          <ac:chgData name="BILLY FETZNER" userId="b71de0b7-effb-42ad-83f4-88aca26ed7aa" providerId="ADAL" clId="{0011081B-F696-42EB-A1AD-0C3DAE63D03F}" dt="2019-11-27T00:02:54.127" v="2556" actId="1076"/>
+          <ac:spMkLst>
+            <pc:docMk/>
+            <pc:sldMk cId="3455149168" sldId="264"/>
+            <ac:spMk id="3" creationId="{76B2996B-FC6D-4E7A-AFE0-D58567CCF160}"/>
+          </ac:spMkLst>
+        </pc:spChg>
       </pc:sldChg>
-      <pc:sldChg chg="add">
-        <pc:chgData name="BILLY FETZNER" userId="b71de0b7-effb-42ad-83f4-88aca26ed7aa" providerId="ADAL" clId="{0011081B-F696-42EB-A1AD-0C3DAE63D03F}" dt="2019-11-26T22:49:40.562" v="811"/>
+      <pc:sldChg chg="addSp delSp modSp add">
+        <pc:chgData name="BILLY FETZNER" userId="b71de0b7-effb-42ad-83f4-88aca26ed7aa" providerId="ADAL" clId="{0011081B-F696-42EB-A1AD-0C3DAE63D03F}" dt="2019-11-26T23:42:54.356" v="2303" actId="20577"/>
         <pc:sldMkLst>
           <pc:docMk/>
           <pc:sldMk cId="2602544147" sldId="265"/>
         </pc:sldMkLst>
+        <pc:spChg chg="mod">
+          <ac:chgData name="BILLY FETZNER" userId="b71de0b7-effb-42ad-83f4-88aca26ed7aa" providerId="ADAL" clId="{0011081B-F696-42EB-A1AD-0C3DAE63D03F}" dt="2019-11-26T23:38:34.324" v="2120" actId="20577"/>
+          <ac:spMkLst>
+            <pc:docMk/>
+            <pc:sldMk cId="2602544147" sldId="265"/>
+            <ac:spMk id="2" creationId="{B1305C7A-2F7A-4922-8976-3471C885EE50}"/>
+          </ac:spMkLst>
+        </pc:spChg>
+        <pc:spChg chg="add del mod">
+          <ac:chgData name="BILLY FETZNER" userId="b71de0b7-effb-42ad-83f4-88aca26ed7aa" providerId="ADAL" clId="{0011081B-F696-42EB-A1AD-0C3DAE63D03F}" dt="2019-11-26T23:42:54.356" v="2303" actId="20577"/>
+          <ac:spMkLst>
+            <pc:docMk/>
+            <pc:sldMk cId="2602544147" sldId="265"/>
+            <ac:spMk id="3" creationId="{76B2996B-FC6D-4E7A-AFE0-D58567CCF160}"/>
+          </ac:spMkLst>
+        </pc:spChg>
+        <pc:picChg chg="add del mod">
+          <ac:chgData name="BILLY FETZNER" userId="b71de0b7-effb-42ad-83f4-88aca26ed7aa" providerId="ADAL" clId="{0011081B-F696-42EB-A1AD-0C3DAE63D03F}" dt="2019-11-26T23:40:45.766" v="2126" actId="931"/>
+          <ac:picMkLst>
+            <pc:docMk/>
+            <pc:sldMk cId="2602544147" sldId="265"/>
+            <ac:picMk id="5" creationId="{1736D3D6-DD7A-445D-8788-A8C5CCDE5805}"/>
+          </ac:picMkLst>
+        </pc:picChg>
+        <pc:picChg chg="add mod">
+          <ac:chgData name="BILLY FETZNER" userId="b71de0b7-effb-42ad-83f4-88aca26ed7aa" providerId="ADAL" clId="{0011081B-F696-42EB-A1AD-0C3DAE63D03F}" dt="2019-11-26T23:41:01.843" v="2135" actId="962"/>
+          <ac:picMkLst>
+            <pc:docMk/>
+            <pc:sldMk cId="2602544147" sldId="265"/>
+            <ac:picMk id="7" creationId="{2DCFA990-4907-4E99-A180-3B91505C2EE8}"/>
+          </ac:picMkLst>
+        </pc:picChg>
       </pc:sldChg>
       <pc:sldChg chg="modSp add del">
         <pc:chgData name="BILLY FETZNER" userId="b71de0b7-effb-42ad-83f4-88aca26ed7aa" providerId="ADAL" clId="{0011081B-F696-42EB-A1AD-0C3DAE63D03F}" dt="2019-11-26T23:06:28.777" v="1893" actId="2696"/>
@@ -5147,13 +5219,97 @@
           <a:bodyPr/>
           <a:lstStyle/>
           <a:p>
-            <a:pPr marL="0" indent="0">
-              <a:buNone/>
-            </a:pPr>
-            <a:endParaRPr lang="en-US" dirty="0"/>
-          </a:p>
-        </p:txBody>
-      </p:sp>
+            <a:r>
+              <a:rPr lang="en-US" dirty="0"/>
+              <a:t>Formatted data with metrics moved to columns</a:t>
+            </a:r>
+          </a:p>
+          <a:p>
+            <a:r>
+              <a:rPr lang="en-US" dirty="0"/>
+              <a:t>Iterative Imputer</a:t>
+            </a:r>
+          </a:p>
+          <a:p>
+            <a:r>
+              <a:rPr lang="en-US" dirty="0"/>
+              <a:t>Outliers</a:t>
+            </a:r>
+          </a:p>
+        </p:txBody>
+      </p:sp>
+      <p:pic>
+        <p:nvPicPr>
+          <p:cNvPr id="5" name="Picture 4" descr="A close up of a building&#10;&#10;Description automatically generated">
+            <a:extLst>
+              <a:ext uri="{FF2B5EF4-FFF2-40B4-BE49-F238E27FC236}">
+                <a16:creationId xmlns:a16="http://schemas.microsoft.com/office/drawing/2014/main" id="{7CA15F40-C6E1-4428-9C79-1D05F46AEA7F}"/>
+              </a:ext>
+            </a:extLst>
+          </p:cNvPr>
+          <p:cNvPicPr>
+            <a:picLocks noChangeAspect="1"/>
+          </p:cNvPicPr>
+          <p:nvPr/>
+        </p:nvPicPr>
+        <p:blipFill>
+          <a:blip r:embed="rId2">
+            <a:extLst>
+              <a:ext uri="{28A0092B-C50C-407E-A947-70E740481C1C}">
+                <a14:useLocalDpi xmlns:a14="http://schemas.microsoft.com/office/drawing/2010/main" val="0"/>
+              </a:ext>
+            </a:extLst>
+          </a:blip>
+          <a:stretch>
+            <a:fillRect/>
+          </a:stretch>
+        </p:blipFill>
+        <p:spPr>
+          <a:xfrm>
+            <a:off x="6096000" y="2771775"/>
+            <a:ext cx="6096000" cy="4086225"/>
+          </a:xfrm>
+          <a:prstGeom prst="rect">
+            <a:avLst/>
+          </a:prstGeom>
+        </p:spPr>
+      </p:pic>
+      <p:pic>
+        <p:nvPicPr>
+          <p:cNvPr id="7" name="Picture 6" descr="A picture containing device, bunch, group&#10;&#10;Description automatically generated">
+            <a:extLst>
+              <a:ext uri="{FF2B5EF4-FFF2-40B4-BE49-F238E27FC236}">
+                <a16:creationId xmlns:a16="http://schemas.microsoft.com/office/drawing/2014/main" id="{D0F6B1D1-0B7A-47AE-A0DF-5946F5484BEC}"/>
+              </a:ext>
+            </a:extLst>
+          </p:cNvPr>
+          <p:cNvPicPr>
+            <a:picLocks noChangeAspect="1"/>
+          </p:cNvPicPr>
+          <p:nvPr/>
+        </p:nvPicPr>
+        <p:blipFill>
+          <a:blip r:embed="rId3">
+            <a:extLst>
+              <a:ext uri="{28A0092B-C50C-407E-A947-70E740481C1C}">
+                <a14:useLocalDpi xmlns:a14="http://schemas.microsoft.com/office/drawing/2010/main" val="0"/>
+              </a:ext>
+            </a:extLst>
+          </a:blip>
+          <a:stretch>
+            <a:fillRect/>
+          </a:stretch>
+        </p:blipFill>
+        <p:spPr>
+          <a:xfrm>
+            <a:off x="1" y="3548380"/>
+            <a:ext cx="6096000" cy="3314700"/>
+          </a:xfrm>
+          <a:prstGeom prst="rect">
+            <a:avLst/>
+          </a:prstGeom>
+        </p:spPr>
+      </p:pic>
     </p:spTree>
     <p:extLst>
       <p:ext uri="{BB962C8B-B14F-4D97-AF65-F5344CB8AC3E}">
@@ -5242,7 +5398,7 @@
           <a:p>
             <a:r>
               <a:rPr lang="en-US" dirty="0"/>
-              <a:t>Data Analysis</a:t>
+              <a:t>Data Analysis: Scaling</a:t>
             </a:r>
           </a:p>
         </p:txBody>
@@ -5263,19 +5419,99 @@
             <p:ph idx="1"/>
           </p:nvPr>
         </p:nvSpPr>
-        <p:spPr/>
-        <p:txBody>
-          <a:bodyPr/>
-          <a:lstStyle/>
-          <a:p>
-            <a:pPr marL="514350" indent="-514350">
-              <a:buFont typeface="+mj-lt"/>
-              <a:buAutoNum type="arabicPeriod"/>
-            </a:pPr>
-            <a:endParaRPr lang="en-US" dirty="0"/>
-          </a:p>
-        </p:txBody>
-      </p:sp>
+        <p:spPr>
+          <a:xfrm>
+            <a:off x="15240" y="1771650"/>
+            <a:ext cx="4375785" cy="4351338"/>
+          </a:xfrm>
+        </p:spPr>
+        <p:txBody>
+          <a:bodyPr/>
+          <a:lstStyle/>
+          <a:p>
+            <a:r>
+              <a:rPr lang="en-US" dirty="0"/>
+              <a:t>Tested for normality</a:t>
+            </a:r>
+          </a:p>
+          <a:p>
+            <a:pPr lvl="1"/>
+            <a:r>
+              <a:rPr lang="en-US" dirty="0"/>
+              <a:t>Shapiro-Wilkes</a:t>
+            </a:r>
+          </a:p>
+          <a:p>
+            <a:pPr lvl="1"/>
+            <a:r>
+              <a:rPr lang="en-US" dirty="0"/>
+              <a:t>D’Agostino’s</a:t>
+            </a:r>
+          </a:p>
+          <a:p>
+            <a:r>
+              <a:rPr lang="en-US" dirty="0"/>
+              <a:t>City data</a:t>
+            </a:r>
+          </a:p>
+          <a:p>
+            <a:pPr lvl="1"/>
+            <a:r>
+              <a:rPr lang="en-US" dirty="0"/>
+              <a:t>Power Transformation (Yeo-Johnson)</a:t>
+            </a:r>
+          </a:p>
+          <a:p>
+            <a:r>
+              <a:rPr lang="en-US" dirty="0"/>
+              <a:t>Tract data</a:t>
+            </a:r>
+          </a:p>
+          <a:p>
+            <a:pPr lvl="1"/>
+            <a:r>
+              <a:rPr lang="en-US" dirty="0"/>
+              <a:t>Quantile Transformation</a:t>
+            </a:r>
+          </a:p>
+        </p:txBody>
+      </p:sp>
+      <p:pic>
+        <p:nvPicPr>
+          <p:cNvPr id="7" name="Picture 6" descr="A close up of a blue wall&#10;&#10;Description automatically generated">
+            <a:extLst>
+              <a:ext uri="{FF2B5EF4-FFF2-40B4-BE49-F238E27FC236}">
+                <a16:creationId xmlns:a16="http://schemas.microsoft.com/office/drawing/2014/main" id="{2DCFA990-4907-4E99-A180-3B91505C2EE8}"/>
+              </a:ext>
+            </a:extLst>
+          </p:cNvPr>
+          <p:cNvPicPr>
+            <a:picLocks noChangeAspect="1"/>
+          </p:cNvPicPr>
+          <p:nvPr/>
+        </p:nvPicPr>
+        <p:blipFill>
+          <a:blip r:embed="rId2">
+            <a:extLst>
+              <a:ext uri="{28A0092B-C50C-407E-A947-70E740481C1C}">
+                <a14:useLocalDpi xmlns:a14="http://schemas.microsoft.com/office/drawing/2010/main" val="0"/>
+              </a:ext>
+            </a:extLst>
+          </a:blip>
+          <a:stretch>
+            <a:fillRect/>
+          </a:stretch>
+        </p:blipFill>
+        <p:spPr>
+          <a:xfrm>
+            <a:off x="4391025" y="1771650"/>
+            <a:ext cx="7800975" cy="5086350"/>
+          </a:xfrm>
+          <a:prstGeom prst="rect">
+            <a:avLst/>
+          </a:prstGeom>
+        </p:spPr>
+      </p:pic>
     </p:spTree>
     <p:extLst>
       <p:ext uri="{BB962C8B-B14F-4D97-AF65-F5344CB8AC3E}">
@@ -5364,7 +5600,7 @@
           <a:p>
             <a:r>
               <a:rPr lang="en-US" dirty="0"/>
-              <a:t>Machine Learning</a:t>
+              <a:t>Machine Learning: Clustering</a:t>
             </a:r>
           </a:p>
         </p:txBody>
@@ -5385,19 +5621,75 @@
             <p:ph idx="1"/>
           </p:nvPr>
         </p:nvSpPr>
-        <p:spPr/>
-        <p:txBody>
-          <a:bodyPr/>
-          <a:lstStyle/>
-          <a:p>
-            <a:pPr marL="514350" indent="-514350">
-              <a:buFont typeface="+mj-lt"/>
-              <a:buAutoNum type="arabicPeriod"/>
-            </a:pPr>
+        <p:spPr>
+          <a:xfrm>
+            <a:off x="0" y="1690688"/>
+            <a:ext cx="5813979" cy="4351338"/>
+          </a:xfrm>
+        </p:spPr>
+        <p:txBody>
+          <a:bodyPr/>
+          <a:lstStyle/>
+          <a:p>
+            <a:r>
+              <a:rPr lang="en-US" dirty="0"/>
+              <a:t>Several Clustering methods</a:t>
+            </a:r>
+          </a:p>
+          <a:p>
+            <a:r>
+              <a:rPr lang="en-US" dirty="0"/>
+              <a:t>Create clusters that classification could classify on</a:t>
+            </a:r>
+          </a:p>
+          <a:p>
+            <a:r>
+              <a:rPr lang="en-US" dirty="0"/>
+              <a:t>Best:</a:t>
+            </a:r>
+          </a:p>
+          <a:p>
+            <a:pPr lvl="1"/>
             <a:endParaRPr lang="en-US" dirty="0"/>
           </a:p>
         </p:txBody>
       </p:sp>
+      <p:pic>
+        <p:nvPicPr>
+          <p:cNvPr id="5" name="Picture 4" descr="A screenshot of a cell phone&#10;&#10;Description automatically generated">
+            <a:extLst>
+              <a:ext uri="{FF2B5EF4-FFF2-40B4-BE49-F238E27FC236}">
+                <a16:creationId xmlns:a16="http://schemas.microsoft.com/office/drawing/2014/main" id="{39C1EFCD-FF98-44B1-9260-49C526E4AB0C}"/>
+              </a:ext>
+            </a:extLst>
+          </p:cNvPr>
+          <p:cNvPicPr>
+            <a:picLocks noChangeAspect="1"/>
+          </p:cNvPicPr>
+          <p:nvPr/>
+        </p:nvPicPr>
+        <p:blipFill>
+          <a:blip r:embed="rId2">
+            <a:extLst>
+              <a:ext uri="{28A0092B-C50C-407E-A947-70E740481C1C}">
+                <a14:useLocalDpi xmlns:a14="http://schemas.microsoft.com/office/drawing/2010/main" val="0"/>
+              </a:ext>
+            </a:extLst>
+          </a:blip>
+          <a:stretch>
+            <a:fillRect/>
+          </a:stretch>
+        </p:blipFill>
+        <p:spPr>
+          <a:xfrm>
+            <a:off x="5109421" y="1690688"/>
+            <a:ext cx="7082579" cy="5167312"/>
+          </a:xfrm>
+          <a:prstGeom prst="rect">
+            <a:avLst/>
+          </a:prstGeom>
+        </p:spPr>
+      </p:pic>
     </p:spTree>
     <p:extLst>
       <p:ext uri="{BB962C8B-B14F-4D97-AF65-F5344CB8AC3E}">
@@ -5507,15 +5799,28 @@
             <p:ph idx="1"/>
           </p:nvPr>
         </p:nvSpPr>
-        <p:spPr/>
-        <p:txBody>
-          <a:bodyPr/>
-          <a:lstStyle/>
-          <a:p>
-            <a:pPr marL="514350" indent="-514350">
-              <a:buFont typeface="+mj-lt"/>
-              <a:buAutoNum type="arabicPeriod"/>
-            </a:pPr>
+        <p:spPr>
+          <a:xfrm>
+            <a:off x="0" y="1764665"/>
+            <a:ext cx="10515600" cy="4351338"/>
+          </a:xfrm>
+        </p:spPr>
+        <p:txBody>
+          <a:bodyPr/>
+          <a:lstStyle/>
+          <a:p>
+            <a:r>
+              <a:rPr lang="en-US" dirty="0"/>
+              <a:t>In conjunction with cluster labels from ___________</a:t>
+            </a:r>
+          </a:p>
+          <a:p>
+            <a:r>
+              <a:rPr lang="en-US" dirty="0"/>
+              <a:t>Best Model: </a:t>
+            </a:r>
+          </a:p>
+          <a:p>
             <a:endParaRPr lang="en-US" dirty="0"/>
           </a:p>
         </p:txBody>

</xml_diff>

<commit_message>
added new data, adjustments to Health Scores ppt
</commit_message>
<xml_diff>
--- a/Presentation_Health_Scores_CAP2.pptx
+++ b/Presentation_Health_Scores_CAP2.pptx
@@ -115,13 +115,18 @@
       </a:defRPr>
     </a:lvl9pPr>
   </p:defaultTextStyle>
+  <p:extLst>
+    <p:ext uri="{EFAFB233-063F-42B5-8137-9DF3F51BA10A}">
+      <p15:sldGuideLst xmlns:p15="http://schemas.microsoft.com/office/powerpoint/2012/main"/>
+    </p:ext>
+  </p:extLst>
 </p:presentation>
 </file>
 
 <file path=ppt/revisionInfo.xml><?xml version="1.0" encoding="utf-8"?>
 <p1510:revInfo xmlns:a="http://schemas.openxmlformats.org/drawingml/2006/main" xmlns:r="http://schemas.openxmlformats.org/officeDocument/2006/relationships" xmlns:p1510="http://schemas.microsoft.com/office/powerpoint/2015/10/main">
   <p1510:revLst>
-    <p1510:client id="{0011081B-F696-42EB-A1AD-0C3DAE63D03F}" v="38" dt="2019-11-27T00:02:25.230"/>
+    <p1510:client id="{0011081B-F696-42EB-A1AD-0C3DAE63D03F}" v="49" dt="2019-11-27T00:43:14.481"/>
   </p1510:revLst>
 </p1510:revInfo>
 </file>
@@ -131,10 +136,41 @@
   <pc:docChgLst>
     <pc:chgData name="BILLY FETZNER" userId="b71de0b7-effb-42ad-83f4-88aca26ed7aa" providerId="ADAL" clId="{0011081B-F696-42EB-A1AD-0C3DAE63D03F}"/>
     <pc:docChg chg="undo custSel addSld delSld modSld sldOrd">
-      <pc:chgData name="BILLY FETZNER" userId="b71de0b7-effb-42ad-83f4-88aca26ed7aa" providerId="ADAL" clId="{0011081B-F696-42EB-A1AD-0C3DAE63D03F}" dt="2019-11-27T00:02:54.127" v="2556" actId="1076"/>
+      <pc:chgData name="BILLY FETZNER" userId="b71de0b7-effb-42ad-83f4-88aca26ed7aa" providerId="ADAL" clId="{0011081B-F696-42EB-A1AD-0C3DAE63D03F}" dt="2019-11-27T00:43:14.476" v="2722" actId="20577"/>
       <pc:docMkLst>
         <pc:docMk/>
       </pc:docMkLst>
+      <pc:sldChg chg="addSp modSp">
+        <pc:chgData name="BILLY FETZNER" userId="b71de0b7-effb-42ad-83f4-88aca26ed7aa" providerId="ADAL" clId="{0011081B-F696-42EB-A1AD-0C3DAE63D03F}" dt="2019-11-27T00:32:47.659" v="2708" actId="1076"/>
+        <pc:sldMkLst>
+          <pc:docMk/>
+          <pc:sldMk cId="2474780924" sldId="257"/>
+        </pc:sldMkLst>
+        <pc:spChg chg="mod">
+          <ac:chgData name="BILLY FETZNER" userId="b71de0b7-effb-42ad-83f4-88aca26ed7aa" providerId="ADAL" clId="{0011081B-F696-42EB-A1AD-0C3DAE63D03F}" dt="2019-11-27T00:32:03.248" v="2705" actId="20577"/>
+          <ac:spMkLst>
+            <pc:docMk/>
+            <pc:sldMk cId="2474780924" sldId="257"/>
+            <ac:spMk id="3" creationId="{76B2996B-FC6D-4E7A-AFE0-D58567CCF160}"/>
+          </ac:spMkLst>
+        </pc:spChg>
+        <pc:spChg chg="add mod">
+          <ac:chgData name="BILLY FETZNER" userId="b71de0b7-effb-42ad-83f4-88aca26ed7aa" providerId="ADAL" clId="{0011081B-F696-42EB-A1AD-0C3DAE63D03F}" dt="2019-11-27T00:32:47.659" v="2708" actId="1076"/>
+          <ac:spMkLst>
+            <pc:docMk/>
+            <pc:sldMk cId="2474780924" sldId="257"/>
+            <ac:spMk id="6" creationId="{74E7CCCF-E5D3-417E-A507-856972E0FF65}"/>
+          </ac:spMkLst>
+        </pc:spChg>
+        <pc:picChg chg="add mod">
+          <ac:chgData name="BILLY FETZNER" userId="b71de0b7-effb-42ad-83f4-88aca26ed7aa" providerId="ADAL" clId="{0011081B-F696-42EB-A1AD-0C3DAE63D03F}" dt="2019-11-27T00:32:47.659" v="2708" actId="1076"/>
+          <ac:picMkLst>
+            <pc:docMk/>
+            <pc:sldMk cId="2474780924" sldId="257"/>
+            <ac:picMk id="5" creationId="{49289720-05C8-480C-89CD-F1461B3905C0}"/>
+          </ac:picMkLst>
+        </pc:picChg>
+      </pc:sldChg>
       <pc:sldChg chg="addSp delSp modSp">
         <pc:chgData name="BILLY FETZNER" userId="b71de0b7-effb-42ad-83f4-88aca26ed7aa" providerId="ADAL" clId="{0011081B-F696-42EB-A1AD-0C3DAE63D03F}" dt="2019-11-26T22:29:06.668" v="343" actId="14100"/>
         <pc:sldMkLst>
@@ -501,7 +537,7 @@
         </pc:spChg>
       </pc:sldChg>
       <pc:sldChg chg="modSp add">
-        <pc:chgData name="BILLY FETZNER" userId="b71de0b7-effb-42ad-83f4-88aca26ed7aa" providerId="ADAL" clId="{0011081B-F696-42EB-A1AD-0C3DAE63D03F}" dt="2019-11-26T22:55:32.512" v="947" actId="12"/>
+        <pc:chgData name="BILLY FETZNER" userId="b71de0b7-effb-42ad-83f4-88aca26ed7aa" providerId="ADAL" clId="{0011081B-F696-42EB-A1AD-0C3DAE63D03F}" dt="2019-11-27T00:43:14.476" v="2722" actId="20577"/>
         <pc:sldMkLst>
           <pc:docMk/>
           <pc:sldMk cId="4020083019" sldId="269"/>
@@ -515,7 +551,7 @@
           </ac:spMkLst>
         </pc:spChg>
         <pc:spChg chg="mod">
-          <ac:chgData name="BILLY FETZNER" userId="b71de0b7-effb-42ad-83f4-88aca26ed7aa" providerId="ADAL" clId="{0011081B-F696-42EB-A1AD-0C3DAE63D03F}" dt="2019-11-26T22:55:32.512" v="947" actId="12"/>
+          <ac:chgData name="BILLY FETZNER" userId="b71de0b7-effb-42ad-83f4-88aca26ed7aa" providerId="ADAL" clId="{0011081B-F696-42EB-A1AD-0C3DAE63D03F}" dt="2019-11-27T00:43:14.476" v="2722" actId="20577"/>
           <ac:spMkLst>
             <pc:docMk/>
             <pc:sldMk cId="4020083019" sldId="269"/>
@@ -4281,7 +4317,9 @@
         </p:nvSpPr>
         <p:spPr/>
         <p:txBody>
-          <a:bodyPr/>
+          <a:bodyPr>
+            <a:normAutofit fontScale="92500" lnSpcReduction="20000"/>
+          </a:bodyPr>
           <a:lstStyle/>
           <a:p>
             <a:r>
@@ -4329,9 +4367,66 @@
             <a:pPr marL="0" indent="0">
               <a:buNone/>
             </a:pPr>
+            <a:r>
+              <a:rPr lang="en-US" dirty="0">
+                <a:hlinkClick r:id="rId4"/>
+              </a:rPr>
+              <a:t>https://imaddabbura.github.io/post/kmeans-clustering/</a:t>
+            </a:r>
             <a:endParaRPr lang="en-US" dirty="0"/>
           </a:p>
           <a:p>
+            <a:pPr marL="0" indent="0">
+              <a:buNone/>
+            </a:pPr>
+            <a:r>
+              <a:rPr lang="en-US" dirty="0">
+                <a:hlinkClick r:id="rId5"/>
+              </a:rPr>
+              <a:t>https://github.com/Microsoft/LightGBM</a:t>
+            </a:r>
+            <a:endParaRPr lang="en-US" dirty="0"/>
+          </a:p>
+          <a:p>
+            <a:pPr marL="0" indent="0">
+              <a:buNone/>
+            </a:pPr>
+            <a:r>
+              <a:rPr lang="en-US" dirty="0">
+                <a:hlinkClick r:id="rId6"/>
+              </a:rPr>
+              <a:t>https://www.analyticsvidhya.com/blog/2019/05/beginners-guide-hierarchical-clustering/</a:t>
+            </a:r>
+            <a:endParaRPr lang="en-US" dirty="0"/>
+          </a:p>
+          <a:p>
+            <a:pPr marL="0" indent="0">
+              <a:buNone/>
+            </a:pPr>
+            <a:r>
+              <a:rPr lang="en-US" dirty="0">
+                <a:hlinkClick r:id="rId7"/>
+              </a:rPr>
+              <a:t>https://www.learndatasci.com/tutorials/k-means-clustering-algorithms-python-intro/</a:t>
+            </a:r>
+            <a:endParaRPr lang="en-US" dirty="0"/>
+          </a:p>
+          <a:p>
+            <a:pPr marL="0" indent="0">
+              <a:buNone/>
+            </a:pPr>
+            <a:r>
+              <a:rPr lang="en-US" dirty="0">
+                <a:hlinkClick r:id="rId8"/>
+              </a:rPr>
+              <a:t>https://www.geeksforgeeks.org/clustering-in-machine-learning/</a:t>
+            </a:r>
+            <a:endParaRPr lang="en-US" dirty="0"/>
+          </a:p>
+          <a:p>
+            <a:pPr marL="0" indent="0">
+              <a:buNone/>
+            </a:pPr>
             <a:endParaRPr lang="en-US" dirty="0"/>
           </a:p>
         </p:txBody>
@@ -4454,7 +4549,168 @@
               <a:buFont typeface="+mj-lt"/>
               <a:buAutoNum type="arabicPeriod"/>
             </a:pPr>
+            <a:r>
+              <a:rPr lang="en-US" dirty="0"/>
+              <a:t>Introduction</a:t>
+            </a:r>
+          </a:p>
+          <a:p>
+            <a:pPr marL="514350" indent="-514350">
+              <a:buFont typeface="+mj-lt"/>
+              <a:buAutoNum type="arabicPeriod"/>
+            </a:pPr>
+            <a:r>
+              <a:rPr lang="en-US" dirty="0"/>
+              <a:t>Importance</a:t>
+            </a:r>
+          </a:p>
+          <a:p>
+            <a:pPr marL="514350" indent="-514350">
+              <a:buFont typeface="+mj-lt"/>
+              <a:buAutoNum type="arabicPeriod"/>
+            </a:pPr>
+            <a:r>
+              <a:rPr lang="en-US" dirty="0"/>
+              <a:t>Data Source</a:t>
+            </a:r>
+          </a:p>
+          <a:p>
+            <a:pPr marL="514350" indent="-514350">
+              <a:buFont typeface="+mj-lt"/>
+              <a:buAutoNum type="arabicPeriod"/>
+            </a:pPr>
+            <a:r>
+              <a:rPr lang="en-US" dirty="0"/>
+              <a:t>Data Analysis</a:t>
+            </a:r>
+          </a:p>
+          <a:p>
+            <a:pPr marL="514350" indent="-514350">
+              <a:buFont typeface="+mj-lt"/>
+              <a:buAutoNum type="arabicPeriod"/>
+            </a:pPr>
+            <a:r>
+              <a:rPr lang="en-US" dirty="0"/>
+              <a:t>Machine Learning</a:t>
+            </a:r>
+          </a:p>
+          <a:p>
+            <a:pPr lvl="1"/>
+            <a:r>
+              <a:rPr lang="en-US" dirty="0"/>
+              <a:t>Clustering</a:t>
+            </a:r>
+          </a:p>
+          <a:p>
+            <a:pPr lvl="1"/>
+            <a:r>
+              <a:rPr lang="en-US" dirty="0"/>
+              <a:t>Classification</a:t>
+            </a:r>
+          </a:p>
+          <a:p>
+            <a:pPr marL="514350" indent="-514350">
+              <a:buFont typeface="+mj-lt"/>
+              <a:buAutoNum type="arabicPeriod"/>
+            </a:pPr>
+            <a:r>
+              <a:rPr lang="en-US" dirty="0"/>
+              <a:t>Conclusion/Call for Action!</a:t>
+            </a:r>
+          </a:p>
+          <a:p>
+            <a:pPr marL="514350" indent="-514350">
+              <a:buFont typeface="+mj-lt"/>
+              <a:buAutoNum type="arabicPeriod"/>
+            </a:pPr>
             <a:endParaRPr lang="en-US" dirty="0"/>
+          </a:p>
+        </p:txBody>
+      </p:sp>
+      <p:pic>
+        <p:nvPicPr>
+          <p:cNvPr id="5" name="Picture 4">
+            <a:extLst>
+              <a:ext uri="{FF2B5EF4-FFF2-40B4-BE49-F238E27FC236}">
+                <a16:creationId xmlns:a16="http://schemas.microsoft.com/office/drawing/2014/main" id="{49289720-05C8-480C-89CD-F1461B3905C0}"/>
+              </a:ext>
+            </a:extLst>
+          </p:cNvPr>
+          <p:cNvPicPr>
+            <a:picLocks noChangeAspect="1"/>
+          </p:cNvPicPr>
+          <p:nvPr/>
+        </p:nvPicPr>
+        <p:blipFill>
+          <a:blip r:embed="rId2">
+            <a:extLst>
+              <a:ext uri="{28A0092B-C50C-407E-A947-70E740481C1C}">
+                <a14:useLocalDpi xmlns:a14="http://schemas.microsoft.com/office/drawing/2010/main" val="0"/>
+              </a:ext>
+              <a:ext uri="{837473B0-CC2E-450A-ABE3-18F120FF3D39}">
+                <a1611:picAttrSrcUrl xmlns:a1611="http://schemas.microsoft.com/office/drawing/2016/11/main" r:id="rId3"/>
+              </a:ext>
+            </a:extLst>
+          </a:blip>
+          <a:stretch>
+            <a:fillRect/>
+          </a:stretch>
+        </p:blipFill>
+        <p:spPr>
+          <a:xfrm>
+            <a:off x="7048500" y="1714500"/>
+            <a:ext cx="5143500" cy="5143500"/>
+          </a:xfrm>
+          <a:prstGeom prst="rect">
+            <a:avLst/>
+          </a:prstGeom>
+        </p:spPr>
+      </p:pic>
+      <p:sp>
+        <p:nvSpPr>
+          <p:cNvPr id="6" name="TextBox 5">
+            <a:extLst>
+              <a:ext uri="{FF2B5EF4-FFF2-40B4-BE49-F238E27FC236}">
+                <a16:creationId xmlns:a16="http://schemas.microsoft.com/office/drawing/2014/main" id="{74E7CCCF-E5D3-417E-A507-856972E0FF65}"/>
+              </a:ext>
+            </a:extLst>
+          </p:cNvPr>
+          <p:cNvSpPr txBox="1"/>
+          <p:nvPr/>
+        </p:nvSpPr>
+        <p:spPr>
+          <a:xfrm>
+            <a:off x="7048500" y="6858000"/>
+            <a:ext cx="5143500" cy="230832"/>
+          </a:xfrm>
+          <a:prstGeom prst="rect">
+            <a:avLst/>
+          </a:prstGeom>
+          <a:noFill/>
+        </p:spPr>
+        <p:txBody>
+          <a:bodyPr wrap="square" rtlCol="0">
+            <a:spAutoFit/>
+          </a:bodyPr>
+          <a:lstStyle/>
+          <a:p>
+            <a:r>
+              <a:rPr lang="en-US" sz="900">
+                <a:hlinkClick r:id="rId3" tooltip="https://en.wikipedia.org/wiki/Wellness_(alternative_medicine)"/>
+              </a:rPr>
+              <a:t>This Photo</a:t>
+            </a:r>
+            <a:r>
+              <a:rPr lang="en-US" sz="900"/>
+              <a:t> by Unknown Author is licensed under </a:t>
+            </a:r>
+            <a:r>
+              <a:rPr lang="en-US" sz="900">
+                <a:hlinkClick r:id="rId4" tooltip="https://creativecommons.org/licenses/by-sa/3.0/"/>
+              </a:rPr>
+              <a:t>CC BY-SA</a:t>
+            </a:r>
+            <a:endParaRPr lang="en-US" sz="900"/>
           </a:p>
         </p:txBody>
       </p:sp>

</xml_diff>